<commit_message>
try to do some refine
</commit_message>
<xml_diff>
--- a/Presentation3.pptx
+++ b/Presentation3.pptx
@@ -3345,6 +3345,36 @@
           <a:chExt cx="0" cy="0"/>
         </a:xfrm>
       </p:grpSpPr>
+      <p:pic>
+        <p:nvPicPr>
+          <p:cNvPr id="5" name="Picture 4">
+            <a:extLst>
+              <a:ext uri="{FF2B5EF4-FFF2-40B4-BE49-F238E27FC236}">
+                <a16:creationId xmlns:a16="http://schemas.microsoft.com/office/drawing/2014/main" id="{477C9BB9-6D3A-412E-E9B6-9F197121C743}"/>
+              </a:ext>
+            </a:extLst>
+          </p:cNvPr>
+          <p:cNvPicPr>
+            <a:picLocks noChangeAspect="1"/>
+          </p:cNvPicPr>
+          <p:nvPr/>
+        </p:nvPicPr>
+        <p:blipFill>
+          <a:blip r:embed="rId2"/>
+          <a:stretch>
+            <a:fillRect/>
+          </a:stretch>
+        </p:blipFill>
+        <p:spPr>
+          <a:xfrm>
+            <a:off x="0" y="-456460"/>
+            <a:ext cx="12192000" cy="7314460"/>
+          </a:xfrm>
+          <a:prstGeom prst="rect">
+            <a:avLst/>
+          </a:prstGeom>
+        </p:spPr>
+      </p:pic>
       <p:sp>
         <p:nvSpPr>
           <p:cNvPr id="2" name="Title 1">
@@ -3363,7 +3393,7 @@
         </p:nvSpPr>
         <p:spPr>
           <a:xfrm>
-            <a:off x="1273215" y="914400"/>
+            <a:off x="1273215" y="221941"/>
             <a:ext cx="9394785" cy="2595563"/>
           </a:xfrm>
         </p:spPr>
@@ -3421,7 +3451,7 @@
         </p:nvSpPr>
         <p:spPr>
           <a:xfrm>
-            <a:off x="1524000" y="4452430"/>
+            <a:off x="1608338" y="3777727"/>
             <a:ext cx="9144000" cy="1655762"/>
           </a:xfrm>
         </p:spPr>
@@ -3430,7 +3460,7 @@
           <a:lstStyle/>
           <a:p>
             <a:r>
-              <a:rPr lang="en-US" sz="2800" kern="100" dirty="0">
+              <a:rPr lang="en-US" sz="2800" b="1" kern="100" dirty="0">
                 <a:effectLst/>
                 <a:latin typeface="Calibri" panose="020F0502020204030204" pitchFamily="34" charset="0"/>
                 <a:ea typeface="DengXian" panose="02010600030101010101" pitchFamily="2" charset="-122"/>
@@ -3439,7 +3469,7 @@
               <a:t>Team: Jenny </a:t>
             </a:r>
             <a:r>
-              <a:rPr lang="en-US" sz="2800" kern="100" dirty="0" err="1">
+              <a:rPr lang="en-US" sz="2800" b="1" kern="100" dirty="0" err="1">
                 <a:effectLst/>
                 <a:latin typeface="Calibri" panose="020F0502020204030204" pitchFamily="34" charset="0"/>
                 <a:ea typeface="DengXian" panose="02010600030101010101" pitchFamily="2" charset="-122"/>
@@ -3448,7 +3478,7 @@
               <a:t>Noga</a:t>
             </a:r>
             <a:r>
-              <a:rPr lang="en-US" sz="2800" kern="100" dirty="0">
+              <a:rPr lang="en-US" sz="2800" b="1" kern="100" dirty="0">
                 <a:effectLst/>
                 <a:latin typeface="Calibri" panose="020F0502020204030204" pitchFamily="34" charset="0"/>
                 <a:ea typeface="DengXian" panose="02010600030101010101" pitchFamily="2" charset="-122"/>
@@ -3458,7 +3488,7 @@
             </a:r>
           </a:p>
           <a:p>
-            <a:endParaRPr lang="en-US" dirty="0"/>
+            <a:endParaRPr lang="en-US" b="1" dirty="0"/>
           </a:p>
         </p:txBody>
       </p:sp>
@@ -3664,7 +3694,7 @@
         </p:nvSpPr>
         <p:spPr bwMode="auto">
           <a:xfrm>
-            <a:off x="181880" y="2928693"/>
+            <a:off x="48710" y="2928693"/>
             <a:ext cx="12886481" cy="184666"/>
           </a:xfrm>
           <a:prstGeom prst="rect">
@@ -5924,7 +5954,7 @@
         </p:nvSpPr>
         <p:spPr>
           <a:xfrm>
-            <a:off x="838200" y="1819921"/>
+            <a:off x="553744" y="639190"/>
             <a:ext cx="10515600" cy="4357041"/>
           </a:xfrm>
         </p:spPr>
@@ -5941,12 +5971,6 @@
               <a:rPr lang="en-US" sz="4800" dirty="0"/>
               <a:t>Thank You !</a:t>
             </a:r>
-          </a:p>
-          <a:p>
-            <a:pPr marL="0" indent="0" algn="ctr">
-              <a:buNone/>
-            </a:pPr>
-            <a:endParaRPr lang="en-US" sz="4800" dirty="0"/>
           </a:p>
           <a:p>
             <a:pPr marL="0" indent="0" algn="ctr">
@@ -5981,6 +6005,36 @@
           </a:p>
         </p:txBody>
       </p:sp>
+      <p:pic>
+        <p:nvPicPr>
+          <p:cNvPr id="4" name="Picture 3">
+            <a:extLst>
+              <a:ext uri="{FF2B5EF4-FFF2-40B4-BE49-F238E27FC236}">
+                <a16:creationId xmlns:a16="http://schemas.microsoft.com/office/drawing/2014/main" id="{C2CFB7C4-2756-22CA-6A35-12F99301D24D}"/>
+              </a:ext>
+            </a:extLst>
+          </p:cNvPr>
+          <p:cNvPicPr>
+            <a:picLocks noChangeAspect="1"/>
+          </p:cNvPicPr>
+          <p:nvPr/>
+        </p:nvPicPr>
+        <p:blipFill>
+          <a:blip r:embed="rId2"/>
+          <a:stretch>
+            <a:fillRect/>
+          </a:stretch>
+        </p:blipFill>
+        <p:spPr>
+          <a:xfrm>
+            <a:off x="926977" y="3252717"/>
+            <a:ext cx="10711279" cy="3508867"/>
+          </a:xfrm>
+          <a:prstGeom prst="rect">
+            <a:avLst/>
+          </a:prstGeom>
+        </p:spPr>
+      </p:pic>
     </p:spTree>
     <p:extLst>
       <p:ext uri="{BB962C8B-B14F-4D97-AF65-F5344CB8AC3E}">
@@ -7244,7 +7298,7 @@
         </p:nvSpPr>
         <p:spPr bwMode="auto">
           <a:xfrm>
-            <a:off x="297290" y="1360144"/>
+            <a:off x="66465" y="1360144"/>
             <a:ext cx="12886481" cy="184666"/>
           </a:xfrm>
           <a:prstGeom prst="rect">

</xml_diff>